<commit_message>
Atualizações Treinamentos NID Tópicos de Informática - 09102023
</commit_message>
<xml_diff>
--- a/00 Lesson Plan/Apresentação - NID Yduqs Wyden - Curso Tópicos em Informática.pptx
+++ b/00 Lesson Plan/Apresentação - NID Yduqs Wyden - Curso Tópicos em Informática.pptx
@@ -4973,8 +4973,8 @@
         </p:nvSpPr>
         <p:spPr>
           <a:xfrm>
-            <a:off x="442913" y="2559082"/>
-            <a:ext cx="5819664" cy="722312"/>
+            <a:off x="442912" y="2559082"/>
+            <a:ext cx="8283399" cy="722312"/>
           </a:xfrm>
           <a:prstGeom prst="rect">
             <a:avLst/>
@@ -4990,7 +4990,7 @@
         </p:spPr>
         <p:txBody>
           <a:bodyPr lIns="45719" rIns="45719" anchor="ctr">
-            <a:normAutofit fontScale="85000" lnSpcReduction="10000"/>
+            <a:normAutofit fontScale="62500" lnSpcReduction="20000"/>
           </a:bodyPr>
           <a:lstStyle>
             <a:lvl1pPr marL="0" marR="0" indent="0" algn="ctr" defTabSz="457200" rtl="0" latinLnBrk="0">
@@ -5269,7 +5269,7 @@
                   <a:schemeClr val="bg1"/>
                 </a:solidFill>
               </a:rPr>
-              <a:t>NID – Núcleo de Inclusão Digital</a:t>
+              <a:t>NID – Núcleo de Inclusão Digital em Parceria Lacre com Amor</a:t>
             </a:r>
           </a:p>
         </p:txBody>
@@ -5307,7 +5307,7 @@
         </p:spPr>
         <p:txBody>
           <a:bodyPr lIns="45719" rIns="45719" anchor="ctr">
-            <a:normAutofit/>
+            <a:normAutofit fontScale="77500" lnSpcReduction="20000"/>
           </a:bodyPr>
           <a:lstStyle>
             <a:lvl1pPr marL="0" marR="0" indent="0" algn="ctr" defTabSz="457200" rtl="0" latinLnBrk="0">
@@ -5602,8 +5602,54 @@
                   <a:schemeClr val="bg1"/>
                 </a:solidFill>
               </a:rPr>
-              <a:t> Heleno Cardoso </a:t>
-            </a:r>
+              <a:t> Heleno Cardoso</a:t>
+            </a:r>
+          </a:p>
+          <a:p>
+            <a:pPr algn="l" defTabSz="265175" hangingPunct="1">
+              <a:defRPr sz="2262">
+                <a:solidFill>
+                  <a:srgbClr val="FFFFFF"/>
+                </a:solidFill>
+              </a:defRPr>
+            </a:pPr>
+            <a:r>
+              <a:rPr lang="pt-BR" sz="3200" b="1" dirty="0">
+                <a:solidFill>
+                  <a:schemeClr val="bg1"/>
+                </a:solidFill>
+              </a:rPr>
+              <a:t>Professor: </a:t>
+            </a:r>
+            <a:r>
+              <a:rPr lang="pt-BR" sz="3200" b="1" dirty="0" err="1">
+                <a:solidFill>
+                  <a:schemeClr val="bg1"/>
+                </a:solidFill>
+              </a:rPr>
+              <a:t>Dr</a:t>
+            </a:r>
+            <a:r>
+              <a:rPr lang="pt-BR" sz="3200" b="1" dirty="0">
+                <a:solidFill>
+                  <a:schemeClr val="bg1"/>
+                </a:solidFill>
+              </a:rPr>
+              <a:t> Roney </a:t>
+            </a:r>
+            <a:r>
+              <a:rPr lang="pt-BR" sz="3200" b="1" dirty="0" err="1">
+                <a:solidFill>
+                  <a:schemeClr val="bg1"/>
+                </a:solidFill>
+              </a:rPr>
+              <a:t>Malaguthe</a:t>
+            </a:r>
+            <a:endParaRPr lang="pt-BR" sz="3200" b="1" dirty="0">
+              <a:solidFill>
+                <a:schemeClr val="bg1"/>
+              </a:solidFill>
+            </a:endParaRPr>
           </a:p>
         </p:txBody>
       </p:sp>
@@ -9356,7 +9402,7 @@
         <p:spPr>
           <a:xfrm>
             <a:off x="382902" y="1236825"/>
-            <a:ext cx="7383853" cy="3970318"/>
+            <a:ext cx="7383853" cy="3139321"/>
           </a:xfrm>
           <a:prstGeom prst="rect">
             <a:avLst/>
@@ -9458,7 +9504,19 @@
             </a:pPr>
             <a:r>
               <a:rPr lang="pt-BR" dirty="0"/>
-              <a:t>07/10 – Noções de Informática (</a:t>
+              <a:t>07/10 – Noções de Informática: </a:t>
+            </a:r>
+            <a:r>
+              <a:rPr lang="pt-BR" b="1" dirty="0">
+                <a:solidFill>
+                  <a:srgbClr val="FF0000"/>
+                </a:solidFill>
+              </a:rPr>
+              <a:t>Arquitetura de Computador</a:t>
+            </a:r>
+            <a:r>
+              <a:rPr lang="pt-BR" dirty="0"/>
+              <a:t> (</a:t>
             </a:r>
             <a:r>
               <a:rPr lang="pt-BR" b="1" dirty="0"/>
@@ -9466,7 +9524,7 @@
             </a:r>
             <a:r>
               <a:rPr lang="pt-BR" dirty="0"/>
-              <a:t> – 3min)</a:t>
+              <a:t> – 3min a 5min)</a:t>
             </a:r>
           </a:p>
           <a:p>
@@ -9474,7 +9532,10 @@
               <a:buFont typeface="Wingdings" panose="05000000000000000000" pitchFamily="2" charset="2"/>
               <a:buChar char="ü"/>
             </a:pPr>
-            <a:endParaRPr lang="pt-BR" dirty="0"/>
+            <a:r>
+              <a:rPr lang="pt-BR" dirty="0"/>
+              <a:t>21/10 – Internet HTML – Parte 1</a:t>
+            </a:r>
           </a:p>
           <a:p>
             <a:pPr marL="285750" indent="-285750">
@@ -9483,11 +9544,11 @@
             </a:pPr>
             <a:r>
               <a:rPr lang="pt-BR" dirty="0"/>
-              <a:t>21/10 – Pensamento Computacional – Parte 1 (</a:t>
+              <a:t>28/10 – Internet HTML – Parte 2 (</a:t>
             </a:r>
             <a:r>
               <a:rPr lang="pt-BR" b="1" dirty="0"/>
-              <a:t>Atividade MM</a:t>
+              <a:t>Atividade Página Web</a:t>
             </a:r>
             <a:r>
               <a:rPr lang="pt-BR" dirty="0"/>
@@ -9499,7 +9560,18 @@
               <a:buFont typeface="Wingdings" panose="05000000000000000000" pitchFamily="2" charset="2"/>
               <a:buChar char="ü"/>
             </a:pPr>
-            <a:endParaRPr lang="pt-BR" dirty="0"/>
+            <a:r>
+              <a:rPr lang="pt-BR" dirty="0"/>
+              <a:t>04/11 – Pensamento Computacional – Parte 1 (</a:t>
+            </a:r>
+            <a:r>
+              <a:rPr lang="pt-BR" b="1" dirty="0"/>
+              <a:t>Atividade MM</a:t>
+            </a:r>
+            <a:r>
+              <a:rPr lang="pt-BR" dirty="0"/>
+              <a:t>)</a:t>
+            </a:r>
           </a:p>
           <a:p>
             <a:pPr marL="285750" indent="-285750">
@@ -9508,7 +9580,7 @@
             </a:pPr>
             <a:r>
               <a:rPr lang="pt-BR" dirty="0"/>
-              <a:t>28/10 – Pensamento Computacional – Parte 2 (</a:t>
+              <a:t>11/11 – Pensamento Computacional – Parte 2 (</a:t>
             </a:r>
             <a:r>
               <a:rPr lang="pt-BR" b="1" dirty="0" err="1"/>
@@ -9544,49 +9616,25 @@
               <a:buFont typeface="Wingdings" panose="05000000000000000000" pitchFamily="2" charset="2"/>
               <a:buChar char="ü"/>
             </a:pPr>
-            <a:endParaRPr lang="pt-BR" dirty="0"/>
-          </a:p>
-          <a:p>
-            <a:pPr marL="285750" indent="-285750">
-              <a:buFont typeface="Wingdings" panose="05000000000000000000" pitchFamily="2" charset="2"/>
-              <a:buChar char="ü"/>
-            </a:pPr>
             <a:r>
               <a:rPr lang="pt-BR" dirty="0"/>
-              <a:t>04/11 – Internet HTML – Parte 1 (</a:t>
+              <a:t>18/11 </a:t>
+            </a:r>
+            <a:r>
+              <a:rPr lang="pt-BR"/>
+              <a:t>- </a:t>
+            </a:r>
+            <a:r>
+              <a:rPr lang="pt-BR" b="1"/>
+              <a:t>Seminário</a:t>
             </a:r>
             <a:r>
               <a:rPr lang="pt-BR" b="1" dirty="0"/>
-              <a:t>Atividade Página Web</a:t>
+              <a:t>:</a:t>
             </a:r>
             <a:r>
               <a:rPr lang="pt-BR" dirty="0"/>
-              <a:t>)</a:t>
-            </a:r>
-          </a:p>
-          <a:p>
-            <a:pPr marL="285750" indent="-285750">
-              <a:buFont typeface="Wingdings" panose="05000000000000000000" pitchFamily="2" charset="2"/>
-              <a:buChar char="ü"/>
-            </a:pPr>
-            <a:endParaRPr lang="pt-BR" dirty="0"/>
-          </a:p>
-          <a:p>
-            <a:pPr marL="285750" indent="-285750">
-              <a:buFont typeface="Wingdings" panose="05000000000000000000" pitchFamily="2" charset="2"/>
-              <a:buChar char="ü"/>
-            </a:pPr>
-            <a:r>
-              <a:rPr lang="pt-BR" dirty="0"/>
-              <a:t>11/11 – Internet HTML – Parte 2 (</a:t>
-            </a:r>
-            <a:r>
-              <a:rPr lang="pt-BR" b="1" dirty="0"/>
-              <a:t>Atividade Mini Seminário</a:t>
-            </a:r>
-            <a:r>
-              <a:rPr lang="pt-BR" dirty="0"/>
-              <a:t> – Palestras – 5min)</a:t>
+              <a:t> Palestra –&gt; mínimo 5min a 10min máximo</a:t>
             </a:r>
           </a:p>
         </p:txBody>
@@ -12208,6 +12256,21 @@
 </file>
 
 <file path=customXml/item1.xml><?xml version="1.0" encoding="utf-8"?>
+<p:properties xmlns:p="http://schemas.microsoft.com/office/2006/metadata/properties" xmlns:xsi="http://www.w3.org/2001/XMLSchema-instance" xmlns:pc="http://schemas.microsoft.com/office/infopath/2007/PartnerControls">
+  <documentManagement/>
+</p:properties>
+</file>
+
+<file path=customXml/item2.xml><?xml version="1.0" encoding="utf-8"?>
+<?mso-contentType ?>
+<FormTemplates xmlns="http://schemas.microsoft.com/sharepoint/v3/contenttype/forms">
+  <Display>DocumentLibraryForm</Display>
+  <Edit>DocumentLibraryForm</Edit>
+  <New>DocumentLibraryForm</New>
+</FormTemplates>
+</file>
+
+<file path=customXml/item3.xml><?xml version="1.0" encoding="utf-8"?>
 <ct:contentTypeSchema xmlns:ct="http://schemas.microsoft.com/office/2006/metadata/contentType" xmlns:ma="http://schemas.microsoft.com/office/2006/metadata/properties/metaAttributes" ct:_="" ma:_="" ma:contentTypeName="Documento" ma:contentTypeID="0x010100E7E326A6FBD7C948AAF887265A2DB080" ma:contentTypeVersion="13" ma:contentTypeDescription="Crie um novo documento." ma:contentTypeScope="" ma:versionID="5629727caf6964b78819cfb788ada473">
   <xsd:schema xmlns:xsd="http://www.w3.org/2001/XMLSchema" xmlns:xs="http://www.w3.org/2001/XMLSchema" xmlns:p="http://schemas.microsoft.com/office/2006/metadata/properties" xmlns:ns2="bab2302b-9cf7-40b9-b316-803bc24ea342" xmlns:ns3="c298cbf6-df3b-44f4-88ee-2b3d9158f680" targetNamespace="http://schemas.microsoft.com/office/2006/metadata/properties" ma:root="true" ma:fieldsID="929990cc5bdd3bebd2af3f9d94cdeeec" ns2:_="" ns3:_="">
     <xsd:import namespace="bab2302b-9cf7-40b9-b316-803bc24ea342"/>
@@ -12430,22 +12493,24 @@
 </ct:contentTypeSchema>
 </file>
 
-<file path=customXml/item2.xml><?xml version="1.0" encoding="utf-8"?>
-<p:properties xmlns:p="http://schemas.microsoft.com/office/2006/metadata/properties" xmlns:xsi="http://www.w3.org/2001/XMLSchema-instance" xmlns:pc="http://schemas.microsoft.com/office/infopath/2007/PartnerControls">
-  <documentManagement/>
-</p:properties>
+<file path=customXml/itemProps1.xml><?xml version="1.0" encoding="utf-8"?>
+<ds:datastoreItem xmlns:ds="http://schemas.openxmlformats.org/officeDocument/2006/customXml" ds:itemID="{961A30F4-F1EA-4F98-A164-76D337EE5565}">
+  <ds:schemaRefs>
+    <ds:schemaRef ds:uri="http://schemas.microsoft.com/office/2006/metadata/properties"/>
+    <ds:schemaRef ds:uri="http://schemas.microsoft.com/office/infopath/2007/PartnerControls"/>
+  </ds:schemaRefs>
+</ds:datastoreItem>
 </file>
 
-<file path=customXml/item3.xml><?xml version="1.0" encoding="utf-8"?>
-<?mso-contentType ?>
-<FormTemplates xmlns="http://schemas.microsoft.com/sharepoint/v3/contenttype/forms">
-  <Display>DocumentLibraryForm</Display>
-  <Edit>DocumentLibraryForm</Edit>
-  <New>DocumentLibraryForm</New>
-</FormTemplates>
+<file path=customXml/itemProps2.xml><?xml version="1.0" encoding="utf-8"?>
+<ds:datastoreItem xmlns:ds="http://schemas.openxmlformats.org/officeDocument/2006/customXml" ds:itemID="{AED456AD-07D2-43E3-AD57-2C9049066662}">
+  <ds:schemaRefs>
+    <ds:schemaRef ds:uri="http://schemas.microsoft.com/sharepoint/v3/contenttype/forms"/>
+  </ds:schemaRefs>
+</ds:datastoreItem>
 </file>
 
-<file path=customXml/itemProps1.xml><?xml version="1.0" encoding="utf-8"?>
+<file path=customXml/itemProps3.xml><?xml version="1.0" encoding="utf-8"?>
 <ds:datastoreItem xmlns:ds="http://schemas.openxmlformats.org/officeDocument/2006/customXml" ds:itemID="{6A7BB859-CC6B-497C-9B96-0A0D80ADCD36}">
   <ds:schemaRefs>
     <ds:schemaRef ds:uri="http://schemas.microsoft.com/office/2006/metadata/contentType"/>
@@ -12462,21 +12527,4 @@
     <ds:schemaRef ds:uri="http://schemas.microsoft.com/internal/obd"/>
   </ds:schemaRefs>
 </ds:datastoreItem>
-</file>
-
-<file path=customXml/itemProps2.xml><?xml version="1.0" encoding="utf-8"?>
-<ds:datastoreItem xmlns:ds="http://schemas.openxmlformats.org/officeDocument/2006/customXml" ds:itemID="{961A30F4-F1EA-4F98-A164-76D337EE5565}">
-  <ds:schemaRefs>
-    <ds:schemaRef ds:uri="http://schemas.microsoft.com/office/2006/metadata/properties"/>
-    <ds:schemaRef ds:uri="http://schemas.microsoft.com/office/infopath/2007/PartnerControls"/>
-  </ds:schemaRefs>
-</ds:datastoreItem>
-</file>
-
-<file path=customXml/itemProps3.xml><?xml version="1.0" encoding="utf-8"?>
-<ds:datastoreItem xmlns:ds="http://schemas.openxmlformats.org/officeDocument/2006/customXml" ds:itemID="{AED456AD-07D2-43E3-AD57-2C9049066662}">
-  <ds:schemaRefs>
-    <ds:schemaRef ds:uri="http://schemas.microsoft.com/sharepoint/v3/contenttype/forms"/>
-  </ds:schemaRefs>
-</ds:datastoreItem>
 </file>
</xml_diff>

<commit_message>
Ajustes slides - 09102023
</commit_message>
<xml_diff>
--- a/00 Lesson Plan/Apresentação - NID Yduqs Wyden - Curso Tópicos em Informática.pptx
+++ b/00 Lesson Plan/Apresentação - NID Yduqs Wyden - Curso Tópicos em Informática.pptx
@@ -3964,7 +3964,7 @@
           </a:ln>
           <a:extLst>
             <a:ext uri="{C572A759-6A51-4108-AA02-DFA0A04FC94B}">
-              <ma14:wrappingTextBoxFlag xmlns:ma14="http://schemas.microsoft.com/office/mac/drawingml/2011/main" xmlns="" val="1"/>
+              <ma14:wrappingTextBoxFlag xmlns="" xmlns:ma14="http://schemas.microsoft.com/office/mac/drawingml/2011/main" val="1"/>
             </a:ext>
           </a:extLst>
         </p:spPr>
@@ -4013,7 +4013,7 @@
           </a:ln>
           <a:extLst>
             <a:ext uri="{C572A759-6A51-4108-AA02-DFA0A04FC94B}">
-              <ma14:wrappingTextBoxFlag xmlns:ma14="http://schemas.microsoft.com/office/mac/drawingml/2011/main" xmlns="" val="1"/>
+              <ma14:wrappingTextBoxFlag xmlns="" xmlns:ma14="http://schemas.microsoft.com/office/mac/drawingml/2011/main" val="1"/>
             </a:ext>
           </a:extLst>
         </p:spPr>
@@ -4984,7 +4984,7 @@
           </a:ln>
           <a:extLst>
             <a:ext uri="{C572A759-6A51-4108-AA02-DFA0A04FC94B}">
-              <ma14:wrappingTextBoxFlag xmlns:ma14="http://schemas.microsoft.com/office/mac/drawingml/2011/main" xmlns="" val="1"/>
+              <ma14:wrappingTextBoxFlag xmlns="" xmlns:ma14="http://schemas.microsoft.com/office/mac/drawingml/2011/main" val="1"/>
             </a:ext>
           </a:extLst>
         </p:spPr>
@@ -5301,7 +5301,7 @@
           </a:ln>
           <a:extLst>
             <a:ext uri="{C572A759-6A51-4108-AA02-DFA0A04FC94B}">
-              <ma14:wrappingTextBoxFlag xmlns:ma14="http://schemas.microsoft.com/office/mac/drawingml/2011/main" xmlns="" val="1"/>
+              <ma14:wrappingTextBoxFlag xmlns="" xmlns:ma14="http://schemas.microsoft.com/office/mac/drawingml/2011/main" val="1"/>
             </a:ext>
           </a:extLst>
         </p:spPr>
@@ -7188,7 +7188,7 @@
           </a:ln>
           <a:extLst>
             <a:ext uri="{C572A759-6A51-4108-AA02-DFA0A04FC94B}">
-              <ma14:wrappingTextBoxFlag xmlns:ma14="http://schemas.microsoft.com/office/mac/drawingml/2011/main" xmlns="" val="1"/>
+              <ma14:wrappingTextBoxFlag xmlns="" xmlns:ma14="http://schemas.microsoft.com/office/mac/drawingml/2011/main" val="1"/>
             </a:ext>
           </a:extLst>
         </p:spPr>
@@ -9439,8 +9439,13 @@
             </a:r>
             <a:r>
               <a:rPr lang="pt-BR" dirty="0"/>
-              <a:t>07/10/2023 à 11/11/2023</a:t>
-            </a:r>
+              <a:t>07/10/2023 </a:t>
+            </a:r>
+            <a:r>
+              <a:rPr lang="pt-BR"/>
+              <a:t>à 18/11/2023</a:t>
+            </a:r>
+            <a:endParaRPr lang="pt-BR" dirty="0"/>
           </a:p>
           <a:p>
             <a:r>
@@ -9618,19 +9623,11 @@
             </a:pPr>
             <a:r>
               <a:rPr lang="pt-BR" dirty="0"/>
-              <a:t>18/11 </a:t>
-            </a:r>
-            <a:r>
-              <a:rPr lang="pt-BR"/>
-              <a:t>- </a:t>
-            </a:r>
-            <a:r>
-              <a:rPr lang="pt-BR" b="1"/>
-              <a:t>Seminário</a:t>
+              <a:t>18/11 - </a:t>
             </a:r>
             <a:r>
               <a:rPr lang="pt-BR" b="1" dirty="0"/>
-              <a:t>:</a:t>
+              <a:t>Seminário:</a:t>
             </a:r>
             <a:r>
               <a:rPr lang="pt-BR" dirty="0"/>
@@ -12256,18 +12253,18 @@
 </file>
 
 <file path=customXml/item1.xml><?xml version="1.0" encoding="utf-8"?>
-<p:properties xmlns:p="http://schemas.microsoft.com/office/2006/metadata/properties" xmlns:xsi="http://www.w3.org/2001/XMLSchema-instance" xmlns:pc="http://schemas.microsoft.com/office/infopath/2007/PartnerControls">
-  <documentManagement/>
-</p:properties>
-</file>
-
-<file path=customXml/item2.xml><?xml version="1.0" encoding="utf-8"?>
 <?mso-contentType ?>
 <FormTemplates xmlns="http://schemas.microsoft.com/sharepoint/v3/contenttype/forms">
   <Display>DocumentLibraryForm</Display>
   <Edit>DocumentLibraryForm</Edit>
   <New>DocumentLibraryForm</New>
 </FormTemplates>
+</file>
+
+<file path=customXml/item2.xml><?xml version="1.0" encoding="utf-8"?>
+<p:properties xmlns:p="http://schemas.microsoft.com/office/2006/metadata/properties" xmlns:xsi="http://www.w3.org/2001/XMLSchema-instance" xmlns:pc="http://schemas.microsoft.com/office/infopath/2007/PartnerControls">
+  <documentManagement/>
+</p:properties>
 </file>
 
 <file path=customXml/item3.xml><?xml version="1.0" encoding="utf-8"?>
@@ -12494,18 +12491,18 @@
 </file>
 
 <file path=customXml/itemProps1.xml><?xml version="1.0" encoding="utf-8"?>
-<ds:datastoreItem xmlns:ds="http://schemas.openxmlformats.org/officeDocument/2006/customXml" ds:itemID="{961A30F4-F1EA-4F98-A164-76D337EE5565}">
+<ds:datastoreItem xmlns:ds="http://schemas.openxmlformats.org/officeDocument/2006/customXml" ds:itemID="{AED456AD-07D2-43E3-AD57-2C9049066662}">
   <ds:schemaRefs>
-    <ds:schemaRef ds:uri="http://schemas.microsoft.com/office/2006/metadata/properties"/>
-    <ds:schemaRef ds:uri="http://schemas.microsoft.com/office/infopath/2007/PartnerControls"/>
+    <ds:schemaRef ds:uri="http://schemas.microsoft.com/sharepoint/v3/contenttype/forms"/>
   </ds:schemaRefs>
 </ds:datastoreItem>
 </file>
 
 <file path=customXml/itemProps2.xml><?xml version="1.0" encoding="utf-8"?>
-<ds:datastoreItem xmlns:ds="http://schemas.openxmlformats.org/officeDocument/2006/customXml" ds:itemID="{AED456AD-07D2-43E3-AD57-2C9049066662}">
+<ds:datastoreItem xmlns:ds="http://schemas.openxmlformats.org/officeDocument/2006/customXml" ds:itemID="{961A30F4-F1EA-4F98-A164-76D337EE5565}">
   <ds:schemaRefs>
-    <ds:schemaRef ds:uri="http://schemas.microsoft.com/sharepoint/v3/contenttype/forms"/>
+    <ds:schemaRef ds:uri="http://schemas.microsoft.com/office/2006/metadata/properties"/>
+    <ds:schemaRef ds:uri="http://schemas.microsoft.com/office/infopath/2007/PartnerControls"/>
   </ds:schemaRefs>
 </ds:datastoreItem>
 </file>

</xml_diff>